<commit_message>
Split Model component to separate diagram
</commit_message>
<xml_diff>
--- a/docs/diagrams/ModelComponentClassDiagram.pptx
+++ b/docs/diagrams/ModelComponentClassDiagram.pptx
@@ -208,7 +208,7 @@
           <a:p>
             <a:fld id="{F5CC4B3F-88C1-4FFA-B1B6-F41C21DC6924}" type="datetimeFigureOut">
               <a:rPr lang="en-US" smtClean="0"/>
-              <a:t>12/5/2018</a:t>
+              <a:t>3/16/2019</a:t>
             </a:fld>
             <a:endParaRPr lang="en-US"/>
           </a:p>
@@ -654,7 +654,7 @@
           <a:p>
             <a:fld id="{78C97017-6FC3-485B-9764-EAC9E56C1D49}" type="datetimeFigureOut">
               <a:rPr lang="en-US" smtClean="0"/>
-              <a:t>12/5/2018</a:t>
+              <a:t>3/16/2019</a:t>
             </a:fld>
             <a:endParaRPr lang="en-US"/>
           </a:p>
@@ -822,7 +822,7 @@
           <a:p>
             <a:fld id="{78C97017-6FC3-485B-9764-EAC9E56C1D49}" type="datetimeFigureOut">
               <a:rPr lang="en-US" smtClean="0"/>
-              <a:t>12/5/2018</a:t>
+              <a:t>3/16/2019</a:t>
             </a:fld>
             <a:endParaRPr lang="en-US"/>
           </a:p>
@@ -1000,7 +1000,7 @@
           <a:p>
             <a:fld id="{78C97017-6FC3-485B-9764-EAC9E56C1D49}" type="datetimeFigureOut">
               <a:rPr lang="en-US" smtClean="0"/>
-              <a:t>12/5/2018</a:t>
+              <a:t>3/16/2019</a:t>
             </a:fld>
             <a:endParaRPr lang="en-US"/>
           </a:p>
@@ -1168,7 +1168,7 @@
           <a:p>
             <a:fld id="{78C97017-6FC3-485B-9764-EAC9E56C1D49}" type="datetimeFigureOut">
               <a:rPr lang="en-US" smtClean="0"/>
-              <a:t>12/5/2018</a:t>
+              <a:t>3/16/2019</a:t>
             </a:fld>
             <a:endParaRPr lang="en-US"/>
           </a:p>
@@ -1413,7 +1413,7 @@
           <a:p>
             <a:fld id="{78C97017-6FC3-485B-9764-EAC9E56C1D49}" type="datetimeFigureOut">
               <a:rPr lang="en-US" smtClean="0"/>
-              <a:t>12/5/2018</a:t>
+              <a:t>3/16/2019</a:t>
             </a:fld>
             <a:endParaRPr lang="en-US"/>
           </a:p>
@@ -1698,7 +1698,7 @@
           <a:p>
             <a:fld id="{78C97017-6FC3-485B-9764-EAC9E56C1D49}" type="datetimeFigureOut">
               <a:rPr lang="en-US" smtClean="0"/>
-              <a:t>12/5/2018</a:t>
+              <a:t>3/16/2019</a:t>
             </a:fld>
             <a:endParaRPr lang="en-US"/>
           </a:p>
@@ -2117,7 +2117,7 @@
           <a:p>
             <a:fld id="{78C97017-6FC3-485B-9764-EAC9E56C1D49}" type="datetimeFigureOut">
               <a:rPr lang="en-US" smtClean="0"/>
-              <a:t>12/5/2018</a:t>
+              <a:t>3/16/2019</a:t>
             </a:fld>
             <a:endParaRPr lang="en-US"/>
           </a:p>
@@ -2234,7 +2234,7 @@
           <a:p>
             <a:fld id="{78C97017-6FC3-485B-9764-EAC9E56C1D49}" type="datetimeFigureOut">
               <a:rPr lang="en-US" smtClean="0"/>
-              <a:t>12/5/2018</a:t>
+              <a:t>3/16/2019</a:t>
             </a:fld>
             <a:endParaRPr lang="en-US"/>
           </a:p>
@@ -2329,7 +2329,7 @@
           <a:p>
             <a:fld id="{78C97017-6FC3-485B-9764-EAC9E56C1D49}" type="datetimeFigureOut">
               <a:rPr lang="en-US" smtClean="0"/>
-              <a:t>12/5/2018</a:t>
+              <a:t>3/16/2019</a:t>
             </a:fld>
             <a:endParaRPr lang="en-US"/>
           </a:p>
@@ -2604,7 +2604,7 @@
           <a:p>
             <a:fld id="{78C97017-6FC3-485B-9764-EAC9E56C1D49}" type="datetimeFigureOut">
               <a:rPr lang="en-US" smtClean="0"/>
-              <a:t>12/5/2018</a:t>
+              <a:t>3/16/2019</a:t>
             </a:fld>
             <a:endParaRPr lang="en-US"/>
           </a:p>
@@ -2856,7 +2856,7 @@
           <a:p>
             <a:fld id="{78C97017-6FC3-485B-9764-EAC9E56C1D49}" type="datetimeFigureOut">
               <a:rPr lang="en-US" smtClean="0"/>
-              <a:t>12/5/2018</a:t>
+              <a:t>3/16/2019</a:t>
             </a:fld>
             <a:endParaRPr lang="en-US"/>
           </a:p>
@@ -3067,7 +3067,7 @@
           <a:p>
             <a:fld id="{78C97017-6FC3-485B-9764-EAC9E56C1D49}" type="datetimeFigureOut">
               <a:rPr lang="en-US" smtClean="0"/>
-              <a:t>12/5/2018</a:t>
+              <a:t>3/16/2019</a:t>
             </a:fld>
             <a:endParaRPr lang="en-US"/>
           </a:p>
@@ -3450,7 +3450,7 @@
         </p:nvSpPr>
         <p:spPr>
           <a:xfrm>
-            <a:off x="1119865" y="1600200"/>
+            <a:off x="1066800" y="1696644"/>
             <a:ext cx="7490735" cy="3124200"/>
           </a:xfrm>
           <a:prstGeom prst="roundRect">
@@ -3630,12 +3630,12 @@
         </p:nvCxnSpPr>
         <p:spPr>
           <a:xfrm rot="5400000" flipH="1" flipV="1">
-            <a:off x="4131507" y="1281685"/>
-            <a:ext cx="613122" cy="4459404"/>
+            <a:off x="4608899" y="763918"/>
+            <a:ext cx="653496" cy="5454563"/>
           </a:xfrm>
           <a:prstGeom prst="bentConnector3">
             <a:avLst>
-              <a:gd name="adj1" fmla="val -26668"/>
+              <a:gd name="adj1" fmla="val -44883"/>
             </a:avLst>
           </a:prstGeom>
           <a:ln w="19050">
@@ -4102,7 +4102,7 @@
         <p:spPr>
           <a:xfrm>
             <a:off x="4692650" y="2846162"/>
-            <a:ext cx="1156969" cy="346760"/>
+            <a:ext cx="2002153" cy="346760"/>
           </a:xfrm>
           <a:prstGeom prst="rect">
             <a:avLst/>
@@ -4139,7 +4139,15 @@
                   <a:srgbClr val="7030A0"/>
                 </a:solidFill>
               </a:rPr>
-              <a:t>UniquePersonList</a:t>
+              <a:t>UniqueItemList</a:t>
+            </a:r>
+            <a:r>
+              <a:rPr lang="en-US" sz="1050" dirty="0">
+                <a:solidFill>
+                  <a:srgbClr val="7030A0"/>
+                </a:solidFill>
+              </a:rPr>
+              <a:t>&lt;? extends Item&gt;</a:t>
             </a:r>
             <a:endParaRPr lang="en-SG" sz="1050" dirty="0">
               <a:solidFill>
@@ -4204,8 +4212,8 @@
         </p:nvSpPr>
         <p:spPr>
           <a:xfrm>
-            <a:off x="6313677" y="2858066"/>
-            <a:ext cx="708186" cy="346760"/>
+            <a:off x="7248660" y="2817692"/>
+            <a:ext cx="828538" cy="346760"/>
           </a:xfrm>
           <a:prstGeom prst="rect">
             <a:avLst/>
@@ -4237,14 +4245,41 @@
           <a:p>
             <a:pPr algn="ctr"/>
             <a:r>
-              <a:rPr lang="en-US" sz="1050" dirty="0">
+              <a:rPr lang="en-US" sz="900" dirty="0">
                 <a:solidFill>
                   <a:srgbClr val="7030A0"/>
                 </a:solidFill>
               </a:rPr>
-              <a:t>Person</a:t>
-            </a:r>
-            <a:endParaRPr lang="en-SG" sz="1050" dirty="0">
+              <a:t>&lt;&lt;</a:t>
+            </a:r>
+            <a:r>
+              <a:rPr lang="en-US" sz="900" dirty="0" err="1">
+                <a:solidFill>
+                  <a:srgbClr val="7030A0"/>
+                </a:solidFill>
+              </a:rPr>
+              <a:t>inferface</a:t>
+            </a:r>
+            <a:r>
+              <a:rPr lang="en-US" sz="900" dirty="0">
+                <a:solidFill>
+                  <a:srgbClr val="7030A0"/>
+                </a:solidFill>
+              </a:rPr>
+              <a:t>&gt;</a:t>
+            </a:r>
+          </a:p>
+          <a:p>
+            <a:pPr algn="ctr"/>
+            <a:r>
+              <a:rPr lang="en-US" sz="900" dirty="0">
+                <a:solidFill>
+                  <a:srgbClr val="7030A0"/>
+                </a:solidFill>
+              </a:rPr>
+              <a:t>Item</a:t>
+            </a:r>
+            <a:endParaRPr lang="en-SG" sz="900" dirty="0">
               <a:solidFill>
                 <a:srgbClr val="7030A0"/>
               </a:solidFill>
@@ -4260,7 +4295,7 @@
         </p:nvSpPr>
         <p:spPr>
           <a:xfrm>
-            <a:off x="5858751" y="2941676"/>
+            <a:off x="6698168" y="2924199"/>
             <a:ext cx="236048" cy="173380"/>
           </a:xfrm>
           <a:prstGeom prst="flowChartDecision">
@@ -4299,27 +4334,30 @@
       </p:sp>
       <p:cxnSp>
         <p:nvCxnSpPr>
-          <p:cNvPr id="64" name="Elbow Connector 63"/>
+          <p:cNvPr id="97" name="Elbow Connector 63"/>
           <p:cNvCxnSpPr>
-            <a:stCxn id="63" idx="3"/>
-            <a:endCxn id="62" idx="1"/>
+            <a:cxnSpLocks/>
+            <a:stCxn id="99" idx="3"/>
           </p:cNvCxnSpPr>
           <p:nvPr/>
         </p:nvCxnSpPr>
         <p:spPr>
-          <a:xfrm>
-            <a:off x="6094799" y="3028366"/>
-            <a:ext cx="218878" cy="3080"/>
+          <a:xfrm rot="16200000" flipH="1">
+            <a:off x="3566454" y="2680653"/>
+            <a:ext cx="274076" cy="1"/>
           </a:xfrm>
           <a:prstGeom prst="bentConnector3">
-            <a:avLst/>
+            <a:avLst>
+              <a:gd name="adj1" fmla="val 50000"/>
+            </a:avLst>
           </a:prstGeom>
           <a:ln w="19050">
             <a:solidFill>
               <a:srgbClr val="7030A0"/>
             </a:solidFill>
+            <a:prstDash val="sysDot"/>
             <a:headEnd type="none" w="med" len="med"/>
-            <a:tailEnd type="arrow" w="med" len="med"/>
+            <a:tailEnd type="none" w="med" len="med"/>
           </a:ln>
           <a:effectLst/>
         </p:spPr>
@@ -4340,18 +4378,24 @@
       </p:cxnSp>
       <p:sp>
         <p:nvSpPr>
-          <p:cNvPr id="76" name="Rectangle 8"/>
+          <p:cNvPr id="99" name="Isosceles Triangle 102"/>
           <p:cNvSpPr/>
           <p:nvPr/>
         </p:nvSpPr>
         <p:spPr>
-          <a:xfrm>
-            <a:off x="7712397" y="2564238"/>
-            <a:ext cx="708186" cy="285783"/>
-          </a:xfrm>
-          <a:prstGeom prst="rect">
+          <a:xfrm rot="10800000" flipV="1">
+            <a:off x="3562299" y="2386554"/>
+            <a:ext cx="282387" cy="157062"/>
+          </a:xfrm>
+          <a:prstGeom prst="triangle">
             <a:avLst/>
           </a:prstGeom>
+          <a:solidFill>
+            <a:schemeClr val="accent4">
+              <a:lumMod val="20000"/>
+              <a:lumOff val="80000"/>
+            </a:schemeClr>
+          </a:solidFill>
           <a:ln w="19050">
             <a:solidFill>
               <a:srgbClr val="7030A0"/>
@@ -4378,17 +4422,9 @@
           <a:lstStyle/>
           <a:p>
             <a:pPr algn="ctr"/>
-            <a:r>
-              <a:rPr lang="en-US" sz="1050" dirty="0">
-                <a:solidFill>
-                  <a:srgbClr val="7030A0"/>
-                </a:solidFill>
-              </a:rPr>
-              <a:t>Name</a:t>
-            </a:r>
-            <a:endParaRPr lang="en-SG" sz="1050" dirty="0">
+            <a:endParaRPr lang="en-SG" sz="1050" b="1">
               <a:solidFill>
-                <a:srgbClr val="7030A0"/>
+                <a:srgbClr val="92D050"/>
               </a:solidFill>
             </a:endParaRPr>
           </a:p>
@@ -4396,21 +4432,18 @@
       </p:sp>
       <p:sp>
         <p:nvSpPr>
-          <p:cNvPr id="78" name="Flowchart: Decision 96"/>
+          <p:cNvPr id="100" name="Rectangle 8"/>
           <p:cNvSpPr/>
           <p:nvPr/>
         </p:nvSpPr>
         <p:spPr>
           <a:xfrm>
-            <a:off x="7041947" y="2948201"/>
-            <a:ext cx="236048" cy="173380"/>
-          </a:xfrm>
-          <a:prstGeom prst="flowChartDecision">
+            <a:off x="1260922" y="1998350"/>
+            <a:ext cx="1443661" cy="364396"/>
+          </a:xfrm>
+          <a:prstGeom prst="rect">
             <a:avLst/>
           </a:prstGeom>
-          <a:solidFill>
-            <a:srgbClr val="7030A0"/>
-          </a:solidFill>
           <a:ln w="19050">
             <a:solidFill>
               <a:srgbClr val="7030A0"/>
@@ -4420,13 +4453,13 @@
         </p:spPr>
         <p:style>
           <a:lnRef idx="1">
-            <a:schemeClr val="accent6"/>
+            <a:schemeClr val="accent4"/>
           </a:lnRef>
           <a:fillRef idx="2">
-            <a:schemeClr val="accent6"/>
+            <a:schemeClr val="accent4"/>
           </a:fillRef>
           <a:effectRef idx="1">
-            <a:schemeClr val="accent6"/>
+            <a:schemeClr val="accent4"/>
           </a:effectRef>
           <a:fontRef idx="minor">
             <a:schemeClr val="dk1"/>
@@ -4437,30 +4470,169 @@
           <a:lstStyle/>
           <a:p>
             <a:pPr algn="ctr"/>
-            <a:endParaRPr lang="en-US" sz="1050"/>
-          </a:p>
-        </p:txBody>
-      </p:sp>
-      <p:cxnSp>
-        <p:nvCxnSpPr>
-          <p:cNvPr id="79" name="Elbow Connector 78"/>
-          <p:cNvCxnSpPr>
-            <a:cxnSpLocks/>
-          </p:cNvCxnSpPr>
+            <a:r>
+              <a:rPr lang="en-US" sz="1050" dirty="0">
+                <a:solidFill>
+                  <a:srgbClr val="7030A0"/>
+                </a:solidFill>
+              </a:rPr>
+              <a:t>&lt;&lt;interface&gt;&gt;</a:t>
+            </a:r>
+            <a:br>
+              <a:rPr lang="en-US" sz="1050" dirty="0">
+                <a:solidFill>
+                  <a:srgbClr val="7030A0"/>
+                </a:solidFill>
+              </a:rPr>
+            </a:br>
+            <a:r>
+              <a:rPr lang="en-US" sz="1050" dirty="0" err="1">
+                <a:solidFill>
+                  <a:srgbClr val="7030A0"/>
+                </a:solidFill>
+              </a:rPr>
+              <a:t>ReadOnlyAddressBook</a:t>
+            </a:r>
+            <a:endParaRPr lang="en-SG" sz="1050" dirty="0">
+              <a:solidFill>
+                <a:srgbClr val="7030A0"/>
+              </a:solidFill>
+            </a:endParaRPr>
+          </a:p>
+        </p:txBody>
+      </p:sp>
+      <p:sp>
+        <p:nvSpPr>
+          <p:cNvPr id="114" name="TextBox 113"/>
+          <p:cNvSpPr txBox="1"/>
           <p:nvPr/>
-        </p:nvCxnSpPr>
-        <p:spPr>
-          <a:xfrm flipV="1">
-            <a:off x="7277995" y="2706821"/>
-            <a:ext cx="434402" cy="327761"/>
-          </a:xfrm>
-          <a:prstGeom prst="bentConnector3">
+        </p:nvSpPr>
+        <p:spPr>
+          <a:xfrm rot="16200000">
+            <a:off x="7351816" y="3568448"/>
+            <a:ext cx="881018" cy="261610"/>
+          </a:xfrm>
+          <a:prstGeom prst="rect">
+            <a:avLst/>
+          </a:prstGeom>
+          <a:noFill/>
+        </p:spPr>
+        <p:txBody>
+          <a:bodyPr wrap="square" rtlCol="0">
+            <a:spAutoFit/>
+          </a:bodyPr>
+          <a:lstStyle/>
+          <a:p>
+            <a:pPr algn="r"/>
+            <a:r>
+              <a:rPr lang="en-US" sz="1100" dirty="0">
+                <a:solidFill>
+                  <a:srgbClr val="7030A0"/>
+                </a:solidFill>
+              </a:rPr>
+              <a:t>filtered list</a:t>
+            </a:r>
+            <a:endParaRPr lang="en-SG" sz="1100" dirty="0">
+              <a:solidFill>
+                <a:srgbClr val="7030A0"/>
+              </a:solidFill>
+            </a:endParaRPr>
+          </a:p>
+        </p:txBody>
+      </p:sp>
+      <p:sp>
+        <p:nvSpPr>
+          <p:cNvPr id="122" name="Rectangle 8"/>
+          <p:cNvSpPr/>
+          <p:nvPr/>
+        </p:nvSpPr>
+        <p:spPr>
+          <a:xfrm>
+            <a:off x="2057401" y="4239491"/>
+            <a:ext cx="1066800" cy="346760"/>
+          </a:xfrm>
+          <a:prstGeom prst="rect">
             <a:avLst/>
           </a:prstGeom>
           <a:ln w="19050">
             <a:solidFill>
               <a:srgbClr val="7030A0"/>
             </a:solidFill>
+          </a:ln>
+          <a:effectLst/>
+        </p:spPr>
+        <p:style>
+          <a:lnRef idx="1">
+            <a:schemeClr val="accent4"/>
+          </a:lnRef>
+          <a:fillRef idx="2">
+            <a:schemeClr val="accent4"/>
+          </a:fillRef>
+          <a:effectRef idx="1">
+            <a:schemeClr val="accent4"/>
+          </a:effectRef>
+          <a:fontRef idx="minor">
+            <a:schemeClr val="dk1"/>
+          </a:fontRef>
+        </p:style>
+        <p:txBody>
+          <a:bodyPr rtlCol="0" anchor="ctr"/>
+          <a:lstStyle/>
+          <a:p>
+            <a:pPr algn="ctr"/>
+            <a:r>
+              <a:rPr lang="en-US" sz="1050" dirty="0">
+                <a:solidFill>
+                  <a:srgbClr val="7030A0"/>
+                </a:solidFill>
+              </a:rPr>
+              <a:t>&lt;&lt;interface&gt;&gt;</a:t>
+            </a:r>
+            <a:br>
+              <a:rPr lang="en-US" sz="1050">
+                <a:solidFill>
+                  <a:srgbClr val="7030A0"/>
+                </a:solidFill>
+              </a:rPr>
+            </a:br>
+            <a:r>
+              <a:rPr lang="en-US" sz="1050" dirty="0" err="1">
+                <a:solidFill>
+                  <a:srgbClr val="7030A0"/>
+                </a:solidFill>
+              </a:rPr>
+              <a:t>ObservableList</a:t>
+            </a:r>
+            <a:endParaRPr lang="en-SG" sz="1050" dirty="0">
+              <a:solidFill>
+                <a:srgbClr val="7030A0"/>
+              </a:solidFill>
+            </a:endParaRPr>
+          </a:p>
+        </p:txBody>
+      </p:sp>
+      <p:cxnSp>
+        <p:nvCxnSpPr>
+          <p:cNvPr id="124" name="Elbow Connector 122"/>
+          <p:cNvCxnSpPr>
+            <a:stCxn id="119" idx="1"/>
+            <a:endCxn id="122" idx="1"/>
+          </p:cNvCxnSpPr>
+          <p:nvPr/>
+        </p:nvCxnSpPr>
+        <p:spPr>
+          <a:xfrm rot="16200000" flipH="1">
+            <a:off x="1364475" y="3719944"/>
+            <a:ext cx="831471" cy="554381"/>
+          </a:xfrm>
+          <a:prstGeom prst="bentConnector2">
+            <a:avLst/>
+          </a:prstGeom>
+          <a:ln w="19050">
+            <a:solidFill>
+              <a:srgbClr val="7030A0"/>
+            </a:solidFill>
+            <a:prstDash val="sysDot"/>
             <a:headEnd type="none" w="med" len="med"/>
             <a:tailEnd type="arrow" w="med" len="med"/>
           </a:ln>
@@ -4483,14 +4655,209 @@
       </p:cxnSp>
       <p:sp>
         <p:nvSpPr>
-          <p:cNvPr id="80" name="Rectangle 8"/>
+          <p:cNvPr id="54" name="TextBox 53"/>
+          <p:cNvSpPr txBox="1"/>
+          <p:nvPr/>
+        </p:nvSpPr>
+        <p:spPr>
+          <a:xfrm>
+            <a:off x="4429979" y="3111479"/>
+            <a:ext cx="189257" cy="178683"/>
+          </a:xfrm>
+          <a:prstGeom prst="rect">
+            <a:avLst/>
+          </a:prstGeom>
+          <a:noFill/>
+        </p:spPr>
+        <p:txBody>
+          <a:bodyPr wrap="square" lIns="0" tIns="0" rIns="0" bIns="0" rtlCol="0">
+            <a:noAutofit/>
+          </a:bodyPr>
+          <a:lstStyle/>
+          <a:p>
+            <a:pPr algn="ctr"/>
+            <a:r>
+              <a:rPr lang="en-US" sz="1100" dirty="0">
+                <a:solidFill>
+                  <a:srgbClr val="7030A0"/>
+                </a:solidFill>
+              </a:rPr>
+              <a:t>1</a:t>
+            </a:r>
+            <a:endParaRPr lang="en-SG" sz="1100" dirty="0">
+              <a:solidFill>
+                <a:srgbClr val="7030A0"/>
+              </a:solidFill>
+            </a:endParaRPr>
+          </a:p>
+        </p:txBody>
+      </p:sp>
+      <p:sp>
+        <p:nvSpPr>
+          <p:cNvPr id="61" name="TextBox 60"/>
+          <p:cNvSpPr txBox="1"/>
+          <p:nvPr/>
+        </p:nvSpPr>
+        <p:spPr>
+          <a:xfrm>
+            <a:off x="7047350" y="3080061"/>
+            <a:ext cx="189257" cy="178683"/>
+          </a:xfrm>
+          <a:prstGeom prst="rect">
+            <a:avLst/>
+          </a:prstGeom>
+          <a:noFill/>
+        </p:spPr>
+        <p:txBody>
+          <a:bodyPr wrap="square" lIns="0" tIns="0" rIns="0" bIns="0" rtlCol="0">
+            <a:noAutofit/>
+          </a:bodyPr>
+          <a:lstStyle/>
+          <a:p>
+            <a:pPr algn="ctr"/>
+            <a:r>
+              <a:rPr lang="en-US" sz="1100" dirty="0">
+                <a:solidFill>
+                  <a:srgbClr val="7030A0"/>
+                </a:solidFill>
+              </a:rPr>
+              <a:t>*</a:t>
+            </a:r>
+            <a:endParaRPr lang="en-SG" sz="1100" dirty="0">
+              <a:solidFill>
+                <a:srgbClr val="7030A0"/>
+              </a:solidFill>
+            </a:endParaRPr>
+          </a:p>
+        </p:txBody>
+      </p:sp>
+      <p:sp>
+        <p:nvSpPr>
+          <p:cNvPr id="65" name="TextBox 64"/>
+          <p:cNvSpPr txBox="1"/>
+          <p:nvPr/>
+        </p:nvSpPr>
+        <p:spPr>
+          <a:xfrm>
+            <a:off x="2573394" y="2756715"/>
+            <a:ext cx="170110" cy="137542"/>
+          </a:xfrm>
+          <a:prstGeom prst="rect">
+            <a:avLst/>
+          </a:prstGeom>
+          <a:noFill/>
+        </p:spPr>
+        <p:txBody>
+          <a:bodyPr wrap="square" lIns="0" tIns="0" rIns="0" bIns="0" rtlCol="0">
+            <a:noAutofit/>
+          </a:bodyPr>
+          <a:lstStyle/>
+          <a:p>
+            <a:pPr algn="ctr"/>
+            <a:r>
+              <a:rPr lang="en-US" sz="1100" dirty="0">
+                <a:solidFill>
+                  <a:srgbClr val="7030A0"/>
+                </a:solidFill>
+              </a:rPr>
+              <a:t>1</a:t>
+            </a:r>
+            <a:endParaRPr lang="en-SG" sz="1100" dirty="0">
+              <a:solidFill>
+                <a:srgbClr val="7030A0"/>
+              </a:solidFill>
+            </a:endParaRPr>
+          </a:p>
+        </p:txBody>
+      </p:sp>
+      <p:sp>
+        <p:nvSpPr>
+          <p:cNvPr id="66" name="TextBox 65"/>
+          <p:cNvSpPr txBox="1"/>
+          <p:nvPr/>
+        </p:nvSpPr>
+        <p:spPr>
+          <a:xfrm>
+            <a:off x="2630191" y="3667737"/>
+            <a:ext cx="189257" cy="178683"/>
+          </a:xfrm>
+          <a:prstGeom prst="rect">
+            <a:avLst/>
+          </a:prstGeom>
+          <a:noFill/>
+        </p:spPr>
+        <p:txBody>
+          <a:bodyPr wrap="square" lIns="0" tIns="0" rIns="0" bIns="0" rtlCol="0">
+            <a:noAutofit/>
+          </a:bodyPr>
+          <a:lstStyle/>
+          <a:p>
+            <a:pPr algn="ctr"/>
+            <a:r>
+              <a:rPr lang="en-US" sz="1100" dirty="0">
+                <a:solidFill>
+                  <a:srgbClr val="7030A0"/>
+                </a:solidFill>
+              </a:rPr>
+              <a:t>1</a:t>
+            </a:r>
+            <a:endParaRPr lang="en-SG" sz="1100" dirty="0">
+              <a:solidFill>
+                <a:srgbClr val="7030A0"/>
+              </a:solidFill>
+            </a:endParaRPr>
+          </a:p>
+        </p:txBody>
+      </p:sp>
+      <p:sp>
+        <p:nvSpPr>
+          <p:cNvPr id="70" name="TextBox 69"/>
+          <p:cNvSpPr txBox="1"/>
+          <p:nvPr/>
+        </p:nvSpPr>
+        <p:spPr>
+          <a:xfrm>
+            <a:off x="7469600" y="3169401"/>
+            <a:ext cx="189257" cy="178683"/>
+          </a:xfrm>
+          <a:prstGeom prst="rect">
+            <a:avLst/>
+          </a:prstGeom>
+          <a:noFill/>
+        </p:spPr>
+        <p:txBody>
+          <a:bodyPr wrap="square" lIns="0" tIns="0" rIns="0" bIns="0" rtlCol="0">
+            <a:noAutofit/>
+          </a:bodyPr>
+          <a:lstStyle/>
+          <a:p>
+            <a:pPr algn="ctr"/>
+            <a:r>
+              <a:rPr lang="en-US" sz="1100" dirty="0">
+                <a:solidFill>
+                  <a:srgbClr val="7030A0"/>
+                </a:solidFill>
+              </a:rPr>
+              <a:t>1</a:t>
+            </a:r>
+            <a:endParaRPr lang="en-SG" sz="1100" dirty="0">
+              <a:solidFill>
+                <a:srgbClr val="7030A0"/>
+              </a:solidFill>
+            </a:endParaRPr>
+          </a:p>
+        </p:txBody>
+      </p:sp>
+      <p:sp>
+        <p:nvSpPr>
+          <p:cNvPr id="55" name="Rectangle 8"/>
           <p:cNvSpPr/>
           <p:nvPr/>
         </p:nvSpPr>
         <p:spPr>
           <a:xfrm>
-            <a:off x="7712397" y="2887216"/>
-            <a:ext cx="708186" cy="285783"/>
+            <a:off x="3170181" y="1998350"/>
+            <a:ext cx="1060683" cy="364396"/>
           </a:xfrm>
           <a:prstGeom prst="rect">
             <a:avLst/>
@@ -4522,12 +4889,12 @@
           <a:p>
             <a:pPr algn="ctr"/>
             <a:r>
-              <a:rPr lang="en-US" sz="1050" dirty="0">
+              <a:rPr lang="en-US" sz="1050" dirty="0" err="1">
                 <a:solidFill>
                   <a:srgbClr val="7030A0"/>
                 </a:solidFill>
               </a:rPr>
-              <a:t>Phone</a:t>
+              <a:t>AddressBook</a:t>
             </a:r>
             <a:endParaRPr lang="en-SG" sz="1050" dirty="0">
               <a:solidFill>
@@ -4539,19 +4906,20 @@
       </p:sp>
       <p:cxnSp>
         <p:nvCxnSpPr>
-          <p:cNvPr id="81" name="Elbow Connector 80"/>
+          <p:cNvPr id="60" name="Straight Arrow Connector 59"/>
           <p:cNvCxnSpPr>
-            <a:stCxn id="78" idx="3"/>
-            <a:endCxn id="80" idx="1"/>
+            <a:cxnSpLocks/>
+            <a:stCxn id="51" idx="1"/>
+            <a:endCxn id="49" idx="1"/>
           </p:cNvCxnSpPr>
           <p:nvPr/>
         </p:nvCxnSpPr>
         <p:spPr>
-          <a:xfrm flipV="1">
-            <a:off x="7277995" y="3030108"/>
-            <a:ext cx="434402" cy="4783"/>
-          </a:xfrm>
-          <a:prstGeom prst="bentConnector3">
+          <a:xfrm>
+            <a:off x="4324972" y="3007222"/>
+            <a:ext cx="367678" cy="12320"/>
+          </a:xfrm>
+          <a:prstGeom prst="straightConnector1">
             <a:avLst/>
           </a:prstGeom>
           <a:ln w="19050">
@@ -4580,18 +4948,26 @@
       </p:cxnSp>
       <p:sp>
         <p:nvSpPr>
-          <p:cNvPr id="83" name="Rectangle 8"/>
+          <p:cNvPr id="68" name="Isosceles Triangle 102"/>
           <p:cNvSpPr/>
           <p:nvPr/>
         </p:nvSpPr>
         <p:spPr>
-          <a:xfrm>
-            <a:off x="7712397" y="3210194"/>
-            <a:ext cx="708186" cy="285783"/>
-          </a:xfrm>
-          <a:prstGeom prst="rect">
-            <a:avLst/>
+          <a:xfrm rot="16200000">
+            <a:off x="2669073" y="2069158"/>
+            <a:ext cx="271014" cy="187417"/>
+          </a:xfrm>
+          <a:prstGeom prst="triangle">
+            <a:avLst>
+              <a:gd name="adj" fmla="val 44517"/>
+            </a:avLst>
           </a:prstGeom>
+          <a:solidFill>
+            <a:schemeClr val="accent4">
+              <a:lumMod val="20000"/>
+              <a:lumOff val="80000"/>
+            </a:schemeClr>
+          </a:solidFill>
           <a:ln w="19050">
             <a:solidFill>
               <a:srgbClr val="7030A0"/>
@@ -4601,13 +4977,13 @@
         </p:spPr>
         <p:style>
           <a:lnRef idx="1">
-            <a:schemeClr val="accent4"/>
+            <a:schemeClr val="accent6"/>
           </a:lnRef>
           <a:fillRef idx="2">
-            <a:schemeClr val="accent4"/>
+            <a:schemeClr val="accent6"/>
           </a:fillRef>
           <a:effectRef idx="1">
-            <a:schemeClr val="accent4"/>
+            <a:schemeClr val="accent6"/>
           </a:effectRef>
           <a:fontRef idx="minor">
             <a:schemeClr val="dk1"/>
@@ -4618,45 +4994,36 @@
           <a:lstStyle/>
           <a:p>
             <a:pPr algn="ctr"/>
-            <a:r>
-              <a:rPr lang="en-US" sz="1050" dirty="0">
-                <a:solidFill>
-                  <a:srgbClr val="7030A0"/>
-                </a:solidFill>
-              </a:rPr>
-              <a:t>Email</a:t>
-            </a:r>
-            <a:endParaRPr lang="en-SG" sz="1050" dirty="0">
-              <a:solidFill>
-                <a:srgbClr val="7030A0"/>
-              </a:solidFill>
-            </a:endParaRPr>
+            <a:endParaRPr lang="en-SG" sz="1050"/>
           </a:p>
         </p:txBody>
       </p:sp>
       <p:cxnSp>
         <p:nvCxnSpPr>
-          <p:cNvPr id="84" name="Elbow Connector 83"/>
+          <p:cNvPr id="69" name="Elbow Connector 63"/>
           <p:cNvCxnSpPr>
-            <a:stCxn id="78" idx="3"/>
-            <a:endCxn id="83" idx="1"/>
+            <a:stCxn id="68" idx="3"/>
+            <a:endCxn id="55" idx="1"/>
           </p:cNvCxnSpPr>
           <p:nvPr/>
         </p:nvCxnSpPr>
         <p:spPr>
           <a:xfrm>
-            <a:off x="7277995" y="3034891"/>
-            <a:ext cx="434402" cy="318195"/>
+            <a:off x="2898289" y="2177727"/>
+            <a:ext cx="271892" cy="2821"/>
           </a:xfrm>
           <a:prstGeom prst="bentConnector3">
-            <a:avLst/>
+            <a:avLst>
+              <a:gd name="adj1" fmla="val 50000"/>
+            </a:avLst>
           </a:prstGeom>
           <a:ln w="19050">
             <a:solidFill>
               <a:srgbClr val="7030A0"/>
             </a:solidFill>
+            <a:prstDash val="sysDot"/>
             <a:headEnd type="none" w="med" len="med"/>
-            <a:tailEnd type="arrow" w="med" len="med"/>
+            <a:tailEnd type="none" w="med" len="med"/>
           </a:ln>
           <a:effectLst/>
         </p:spPr>
@@ -4677,14 +5044,20 @@
       </p:cxnSp>
       <p:sp>
         <p:nvSpPr>
-          <p:cNvPr id="85" name="Rectangle 8"/>
+          <p:cNvPr id="57" name="Rectangle 8">
+            <a:extLst>
+              <a:ext uri="{FF2B5EF4-FFF2-40B4-BE49-F238E27FC236}">
+                <a16:creationId xmlns:a16="http://schemas.microsoft.com/office/drawing/2014/main" id="{6A42DA50-9012-4391-9EF3-285E4FA3FCD8}"/>
+              </a:ext>
+            </a:extLst>
+          </p:cNvPr>
           <p:cNvSpPr/>
           <p:nvPr/>
         </p:nvSpPr>
         <p:spPr>
           <a:xfrm>
-            <a:off x="7712397" y="3533171"/>
-            <a:ext cx="708186" cy="285783"/>
+            <a:off x="4238892" y="3460864"/>
+            <a:ext cx="1293486" cy="346760"/>
           </a:xfrm>
           <a:prstGeom prst="rect">
             <a:avLst/>
@@ -4721,7 +5094,18 @@
                   <a:srgbClr val="7030A0"/>
                 </a:solidFill>
               </a:rPr>
-              <a:t>Address</a:t>
+              <a:t>&lt;&lt;interface&gt;&gt;</a:t>
+            </a:r>
+          </a:p>
+          <a:p>
+            <a:pPr algn="ctr"/>
+            <a:r>
+              <a:rPr lang="en-US" sz="1050" dirty="0" err="1">
+                <a:solidFill>
+                  <a:srgbClr val="7030A0"/>
+                </a:solidFill>
+              </a:rPr>
+              <a:t>ReadOnlyUserPrefs</a:t>
             </a:r>
             <a:endParaRPr lang="en-SG" sz="1050" dirty="0">
               <a:solidFill>
@@ -4731,29 +5115,97 @@
           </a:p>
         </p:txBody>
       </p:sp>
+      <p:sp>
+        <p:nvSpPr>
+          <p:cNvPr id="59" name="Isosceles Triangle 102">
+            <a:extLst>
+              <a:ext uri="{FF2B5EF4-FFF2-40B4-BE49-F238E27FC236}">
+                <a16:creationId xmlns:a16="http://schemas.microsoft.com/office/drawing/2014/main" id="{B263B2D7-6E76-465E-B40E-7E2A46254A84}"/>
+              </a:ext>
+            </a:extLst>
+          </p:cNvPr>
+          <p:cNvSpPr/>
+          <p:nvPr/>
+        </p:nvSpPr>
+        <p:spPr>
+          <a:xfrm rot="5400000" flipH="1">
+            <a:off x="3992636" y="3514414"/>
+            <a:ext cx="271014" cy="221497"/>
+          </a:xfrm>
+          <a:prstGeom prst="triangle">
+            <a:avLst>
+              <a:gd name="adj" fmla="val 44517"/>
+            </a:avLst>
+          </a:prstGeom>
+          <a:solidFill>
+            <a:schemeClr val="accent4">
+              <a:lumMod val="20000"/>
+              <a:lumOff val="80000"/>
+            </a:schemeClr>
+          </a:solidFill>
+          <a:ln w="19050">
+            <a:solidFill>
+              <a:srgbClr val="7030A0"/>
+            </a:solidFill>
+          </a:ln>
+          <a:effectLst/>
+        </p:spPr>
+        <p:style>
+          <a:lnRef idx="1">
+            <a:schemeClr val="accent6"/>
+          </a:lnRef>
+          <a:fillRef idx="2">
+            <a:schemeClr val="accent6"/>
+          </a:fillRef>
+          <a:effectRef idx="1">
+            <a:schemeClr val="accent6"/>
+          </a:effectRef>
+          <a:fontRef idx="minor">
+            <a:schemeClr val="dk1"/>
+          </a:fontRef>
+        </p:style>
+        <p:txBody>
+          <a:bodyPr rtlCol="0" anchor="ctr"/>
+          <a:lstStyle/>
+          <a:p>
+            <a:pPr algn="ctr"/>
+            <a:endParaRPr lang="en-SG" sz="1050"/>
+          </a:p>
+        </p:txBody>
+      </p:sp>
       <p:cxnSp>
         <p:nvCxnSpPr>
-          <p:cNvPr id="86" name="Elbow Connector 85"/>
+          <p:cNvPr id="67" name="Elbow Connector 63">
+            <a:extLst>
+              <a:ext uri="{FF2B5EF4-FFF2-40B4-BE49-F238E27FC236}">
+                <a16:creationId xmlns:a16="http://schemas.microsoft.com/office/drawing/2014/main" id="{BA3A25CD-7C1D-4B3B-B294-1B05ABCFECFD}"/>
+              </a:ext>
+            </a:extLst>
+          </p:cNvPr>
           <p:cNvCxnSpPr>
-            <a:stCxn id="78" idx="3"/>
-            <a:endCxn id="85" idx="1"/>
+            <a:cxnSpLocks/>
+            <a:stCxn id="59" idx="3"/>
+            <a:endCxn id="2" idx="3"/>
           </p:cNvCxnSpPr>
           <p:nvPr/>
         </p:nvCxnSpPr>
         <p:spPr>
-          <a:xfrm>
-            <a:off x="7277995" y="3034891"/>
-            <a:ext cx="434402" cy="641172"/>
+          <a:xfrm rot="10800000">
+            <a:off x="3703491" y="3636621"/>
+            <a:ext cx="313904" cy="3403"/>
           </a:xfrm>
           <a:prstGeom prst="bentConnector3">
-            <a:avLst/>
+            <a:avLst>
+              <a:gd name="adj1" fmla="val 50000"/>
+            </a:avLst>
           </a:prstGeom>
           <a:ln w="19050">
             <a:solidFill>
               <a:srgbClr val="7030A0"/>
             </a:solidFill>
+            <a:prstDash val="sysDot"/>
             <a:headEnd type="none" w="med" len="med"/>
-            <a:tailEnd type="arrow" w="med" len="med"/>
+            <a:tailEnd type="none" w="med" len="med"/>
           </a:ln>
           <a:effectLst/>
         </p:spPr>
@@ -4774,746 +5226,23 @@
       </p:cxnSp>
       <p:cxnSp>
         <p:nvCxnSpPr>
-          <p:cNvPr id="97" name="Elbow Connector 63"/>
-          <p:cNvCxnSpPr>
-            <a:cxnSpLocks/>
-            <a:stCxn id="99" idx="3"/>
-          </p:cNvCxnSpPr>
-          <p:nvPr/>
-        </p:nvCxnSpPr>
-        <p:spPr>
-          <a:xfrm rot="16200000" flipH="1">
-            <a:off x="3566454" y="2680653"/>
-            <a:ext cx="274076" cy="1"/>
-          </a:xfrm>
-          <a:prstGeom prst="bentConnector3">
-            <a:avLst>
-              <a:gd name="adj1" fmla="val 50000"/>
-            </a:avLst>
-          </a:prstGeom>
-          <a:ln w="19050">
-            <a:solidFill>
-              <a:srgbClr val="7030A0"/>
-            </a:solidFill>
-            <a:prstDash val="sysDot"/>
-            <a:headEnd type="none" w="med" len="med"/>
-            <a:tailEnd type="none" w="med" len="med"/>
-          </a:ln>
-          <a:effectLst/>
-        </p:spPr>
-        <p:style>
-          <a:lnRef idx="1">
-            <a:schemeClr val="accent2"/>
-          </a:lnRef>
-          <a:fillRef idx="2">
-            <a:schemeClr val="accent2"/>
-          </a:fillRef>
-          <a:effectRef idx="1">
-            <a:schemeClr val="accent2"/>
-          </a:effectRef>
-          <a:fontRef idx="minor">
-            <a:schemeClr val="dk1"/>
-          </a:fontRef>
-        </p:style>
-      </p:cxnSp>
-      <p:sp>
-        <p:nvSpPr>
-          <p:cNvPr id="99" name="Isosceles Triangle 102"/>
-          <p:cNvSpPr/>
-          <p:nvPr/>
-        </p:nvSpPr>
-        <p:spPr>
-          <a:xfrm rot="10800000" flipV="1">
-            <a:off x="3562299" y="2386554"/>
-            <a:ext cx="282387" cy="157062"/>
-          </a:xfrm>
-          <a:prstGeom prst="triangle">
-            <a:avLst/>
-          </a:prstGeom>
-          <a:solidFill>
-            <a:schemeClr val="accent4">
-              <a:lumMod val="20000"/>
-              <a:lumOff val="80000"/>
-            </a:schemeClr>
-          </a:solidFill>
-          <a:ln w="19050">
-            <a:solidFill>
-              <a:srgbClr val="7030A0"/>
-            </a:solidFill>
-          </a:ln>
-          <a:effectLst/>
-        </p:spPr>
-        <p:style>
-          <a:lnRef idx="1">
-            <a:schemeClr val="accent4"/>
-          </a:lnRef>
-          <a:fillRef idx="2">
-            <a:schemeClr val="accent4"/>
-          </a:fillRef>
-          <a:effectRef idx="1">
-            <a:schemeClr val="accent4"/>
-          </a:effectRef>
-          <a:fontRef idx="minor">
-            <a:schemeClr val="dk1"/>
-          </a:fontRef>
-        </p:style>
-        <p:txBody>
-          <a:bodyPr rtlCol="0" anchor="ctr"/>
-          <a:lstStyle/>
-          <a:p>
-            <a:pPr algn="ctr"/>
-            <a:endParaRPr lang="en-SG" sz="1050" b="1">
-              <a:solidFill>
-                <a:srgbClr val="92D050"/>
-              </a:solidFill>
-            </a:endParaRPr>
-          </a:p>
-        </p:txBody>
-      </p:sp>
-      <p:sp>
-        <p:nvSpPr>
-          <p:cNvPr id="100" name="Rectangle 8"/>
-          <p:cNvSpPr/>
-          <p:nvPr/>
-        </p:nvSpPr>
-        <p:spPr>
-          <a:xfrm>
-            <a:off x="1260922" y="1998350"/>
-            <a:ext cx="1443661" cy="364396"/>
-          </a:xfrm>
-          <a:prstGeom prst="rect">
-            <a:avLst/>
-          </a:prstGeom>
-          <a:ln w="19050">
-            <a:solidFill>
-              <a:srgbClr val="7030A0"/>
-            </a:solidFill>
-          </a:ln>
-          <a:effectLst/>
-        </p:spPr>
-        <p:style>
-          <a:lnRef idx="1">
-            <a:schemeClr val="accent4"/>
-          </a:lnRef>
-          <a:fillRef idx="2">
-            <a:schemeClr val="accent4"/>
-          </a:fillRef>
-          <a:effectRef idx="1">
-            <a:schemeClr val="accent4"/>
-          </a:effectRef>
-          <a:fontRef idx="minor">
-            <a:schemeClr val="dk1"/>
-          </a:fontRef>
-        </p:style>
-        <p:txBody>
-          <a:bodyPr rtlCol="0" anchor="ctr"/>
-          <a:lstStyle/>
-          <a:p>
-            <a:pPr algn="ctr"/>
-            <a:r>
-              <a:rPr lang="en-US" sz="1050" dirty="0">
-                <a:solidFill>
-                  <a:srgbClr val="7030A0"/>
-                </a:solidFill>
-              </a:rPr>
-              <a:t>&lt;&lt;interface&gt;&gt;</a:t>
-            </a:r>
-            <a:br>
-              <a:rPr lang="en-US" sz="1050" dirty="0">
-                <a:solidFill>
-                  <a:srgbClr val="7030A0"/>
-                </a:solidFill>
-              </a:rPr>
-            </a:br>
-            <a:r>
-              <a:rPr lang="en-US" sz="1050" dirty="0" err="1">
-                <a:solidFill>
-                  <a:srgbClr val="7030A0"/>
-                </a:solidFill>
-              </a:rPr>
-              <a:t>ReadOnlyAddressBook</a:t>
-            </a:r>
-            <a:endParaRPr lang="en-SG" sz="1050" dirty="0">
-              <a:solidFill>
-                <a:srgbClr val="7030A0"/>
-              </a:solidFill>
-            </a:endParaRPr>
-          </a:p>
-        </p:txBody>
-      </p:sp>
-      <p:sp>
-        <p:nvSpPr>
-          <p:cNvPr id="114" name="TextBox 113"/>
-          <p:cNvSpPr txBox="1"/>
-          <p:nvPr/>
-        </p:nvSpPr>
-        <p:spPr>
-          <a:xfrm rot="16200000">
-            <a:off x="6362886" y="3586305"/>
-            <a:ext cx="881018" cy="261610"/>
-          </a:xfrm>
-          <a:prstGeom prst="rect">
-            <a:avLst/>
-          </a:prstGeom>
-          <a:noFill/>
-        </p:spPr>
-        <p:txBody>
-          <a:bodyPr wrap="square" rtlCol="0">
-            <a:spAutoFit/>
-          </a:bodyPr>
-          <a:lstStyle/>
-          <a:p>
-            <a:pPr algn="r"/>
-            <a:r>
-              <a:rPr lang="en-US" sz="1100" dirty="0">
-                <a:solidFill>
-                  <a:srgbClr val="7030A0"/>
-                </a:solidFill>
-              </a:rPr>
-              <a:t>filtered list</a:t>
-            </a:r>
-            <a:endParaRPr lang="en-SG" sz="1100" dirty="0">
-              <a:solidFill>
-                <a:srgbClr val="7030A0"/>
-              </a:solidFill>
-            </a:endParaRPr>
-          </a:p>
-        </p:txBody>
-      </p:sp>
-      <p:sp>
-        <p:nvSpPr>
-          <p:cNvPr id="122" name="Rectangle 8"/>
-          <p:cNvSpPr/>
-          <p:nvPr/>
-        </p:nvSpPr>
-        <p:spPr>
-          <a:xfrm>
-            <a:off x="2057401" y="4239491"/>
-            <a:ext cx="1066800" cy="346760"/>
-          </a:xfrm>
-          <a:prstGeom prst="rect">
-            <a:avLst/>
-          </a:prstGeom>
-          <a:ln w="19050">
-            <a:solidFill>
-              <a:srgbClr val="7030A0"/>
-            </a:solidFill>
-          </a:ln>
-          <a:effectLst/>
-        </p:spPr>
-        <p:style>
-          <a:lnRef idx="1">
-            <a:schemeClr val="accent4"/>
-          </a:lnRef>
-          <a:fillRef idx="2">
-            <a:schemeClr val="accent4"/>
-          </a:fillRef>
-          <a:effectRef idx="1">
-            <a:schemeClr val="accent4"/>
-          </a:effectRef>
-          <a:fontRef idx="minor">
-            <a:schemeClr val="dk1"/>
-          </a:fontRef>
-        </p:style>
-        <p:txBody>
-          <a:bodyPr rtlCol="0" anchor="ctr"/>
-          <a:lstStyle/>
-          <a:p>
-            <a:pPr algn="ctr"/>
-            <a:r>
-              <a:rPr lang="en-US" sz="1050" dirty="0">
-                <a:solidFill>
-                  <a:srgbClr val="7030A0"/>
-                </a:solidFill>
-              </a:rPr>
-              <a:t>&lt;&lt;interface&gt;&gt;</a:t>
-            </a:r>
-            <a:br>
-              <a:rPr lang="en-US" sz="1050">
-                <a:solidFill>
-                  <a:srgbClr val="7030A0"/>
-                </a:solidFill>
-              </a:rPr>
-            </a:br>
-            <a:r>
-              <a:rPr lang="en-US" sz="1050" dirty="0" err="1">
-                <a:solidFill>
-                  <a:srgbClr val="7030A0"/>
-                </a:solidFill>
-              </a:rPr>
-              <a:t>ObservableList</a:t>
-            </a:r>
-            <a:endParaRPr lang="en-SG" sz="1050" dirty="0">
-              <a:solidFill>
-                <a:srgbClr val="7030A0"/>
-              </a:solidFill>
-            </a:endParaRPr>
-          </a:p>
-        </p:txBody>
-      </p:sp>
-      <p:cxnSp>
-        <p:nvCxnSpPr>
-          <p:cNvPr id="124" name="Elbow Connector 122"/>
-          <p:cNvCxnSpPr>
-            <a:stCxn id="119" idx="1"/>
-            <a:endCxn id="122" idx="1"/>
-          </p:cNvCxnSpPr>
-          <p:nvPr/>
-        </p:nvCxnSpPr>
-        <p:spPr>
-          <a:xfrm rot="16200000" flipH="1">
-            <a:off x="1364475" y="3719944"/>
-            <a:ext cx="831471" cy="554381"/>
-          </a:xfrm>
-          <a:prstGeom prst="bentConnector2">
-            <a:avLst/>
-          </a:prstGeom>
-          <a:ln w="19050">
-            <a:solidFill>
-              <a:srgbClr val="7030A0"/>
-            </a:solidFill>
-            <a:prstDash val="sysDot"/>
-            <a:headEnd type="none" w="med" len="med"/>
-            <a:tailEnd type="arrow" w="med" len="med"/>
-          </a:ln>
-          <a:effectLst/>
-        </p:spPr>
-        <p:style>
-          <a:lnRef idx="1">
-            <a:schemeClr val="accent2"/>
-          </a:lnRef>
-          <a:fillRef idx="2">
-            <a:schemeClr val="accent2"/>
-          </a:fillRef>
-          <a:effectRef idx="1">
-            <a:schemeClr val="accent2"/>
-          </a:effectRef>
-          <a:fontRef idx="minor">
-            <a:schemeClr val="dk1"/>
-          </a:fontRef>
-        </p:style>
-      </p:cxnSp>
-      <p:sp>
-        <p:nvSpPr>
-          <p:cNvPr id="54" name="TextBox 53"/>
-          <p:cNvSpPr txBox="1"/>
-          <p:nvPr/>
-        </p:nvSpPr>
-        <p:spPr>
-          <a:xfrm>
-            <a:off x="4429979" y="3111479"/>
-            <a:ext cx="189257" cy="178683"/>
-          </a:xfrm>
-          <a:prstGeom prst="rect">
-            <a:avLst/>
-          </a:prstGeom>
-          <a:noFill/>
-        </p:spPr>
-        <p:txBody>
-          <a:bodyPr wrap="square" lIns="0" tIns="0" rIns="0" bIns="0" rtlCol="0">
-            <a:noAutofit/>
-          </a:bodyPr>
-          <a:lstStyle/>
-          <a:p>
-            <a:pPr algn="ctr"/>
-            <a:r>
-              <a:rPr lang="en-US" sz="1100" dirty="0">
-                <a:solidFill>
-                  <a:srgbClr val="7030A0"/>
-                </a:solidFill>
-              </a:rPr>
-              <a:t>1</a:t>
-            </a:r>
-            <a:endParaRPr lang="en-SG" sz="1100" dirty="0">
-              <a:solidFill>
-                <a:srgbClr val="7030A0"/>
-              </a:solidFill>
-            </a:endParaRPr>
-          </a:p>
-        </p:txBody>
-      </p:sp>
-      <p:sp>
-        <p:nvSpPr>
-          <p:cNvPr id="61" name="TextBox 60"/>
-          <p:cNvSpPr txBox="1"/>
-          <p:nvPr/>
-        </p:nvSpPr>
-        <p:spPr>
-          <a:xfrm>
-            <a:off x="6135256" y="3097917"/>
-            <a:ext cx="189257" cy="178683"/>
-          </a:xfrm>
-          <a:prstGeom prst="rect">
-            <a:avLst/>
-          </a:prstGeom>
-          <a:noFill/>
-        </p:spPr>
-        <p:txBody>
-          <a:bodyPr wrap="square" lIns="0" tIns="0" rIns="0" bIns="0" rtlCol="0">
-            <a:noAutofit/>
-          </a:bodyPr>
-          <a:lstStyle/>
-          <a:p>
-            <a:pPr algn="ctr"/>
-            <a:r>
-              <a:rPr lang="en-US" sz="1100" dirty="0">
-                <a:solidFill>
-                  <a:srgbClr val="7030A0"/>
-                </a:solidFill>
-              </a:rPr>
-              <a:t>*</a:t>
-            </a:r>
-            <a:endParaRPr lang="en-SG" sz="1100" dirty="0">
-              <a:solidFill>
-                <a:srgbClr val="7030A0"/>
-              </a:solidFill>
-            </a:endParaRPr>
-          </a:p>
-        </p:txBody>
-      </p:sp>
-      <p:sp>
-        <p:nvSpPr>
-          <p:cNvPr id="65" name="TextBox 64"/>
-          <p:cNvSpPr txBox="1"/>
-          <p:nvPr/>
-        </p:nvSpPr>
-        <p:spPr>
-          <a:xfrm>
-            <a:off x="2573394" y="2756715"/>
-            <a:ext cx="170110" cy="137542"/>
-          </a:xfrm>
-          <a:prstGeom prst="rect">
-            <a:avLst/>
-          </a:prstGeom>
-          <a:noFill/>
-        </p:spPr>
-        <p:txBody>
-          <a:bodyPr wrap="square" lIns="0" tIns="0" rIns="0" bIns="0" rtlCol="0">
-            <a:noAutofit/>
-          </a:bodyPr>
-          <a:lstStyle/>
-          <a:p>
-            <a:pPr algn="ctr"/>
-            <a:r>
-              <a:rPr lang="en-US" sz="1100" dirty="0">
-                <a:solidFill>
-                  <a:srgbClr val="7030A0"/>
-                </a:solidFill>
-              </a:rPr>
-              <a:t>1</a:t>
-            </a:r>
-            <a:endParaRPr lang="en-SG" sz="1100" dirty="0">
-              <a:solidFill>
-                <a:srgbClr val="7030A0"/>
-              </a:solidFill>
-            </a:endParaRPr>
-          </a:p>
-        </p:txBody>
-      </p:sp>
-      <p:sp>
-        <p:nvSpPr>
-          <p:cNvPr id="66" name="TextBox 65"/>
-          <p:cNvSpPr txBox="1"/>
-          <p:nvPr/>
-        </p:nvSpPr>
-        <p:spPr>
-          <a:xfrm>
-            <a:off x="2630191" y="3667737"/>
-            <a:ext cx="189257" cy="178683"/>
-          </a:xfrm>
-          <a:prstGeom prst="rect">
-            <a:avLst/>
-          </a:prstGeom>
-          <a:noFill/>
-        </p:spPr>
-        <p:txBody>
-          <a:bodyPr wrap="square" lIns="0" tIns="0" rIns="0" bIns="0" rtlCol="0">
-            <a:noAutofit/>
-          </a:bodyPr>
-          <a:lstStyle/>
-          <a:p>
-            <a:pPr algn="ctr"/>
-            <a:r>
-              <a:rPr lang="en-US" sz="1100" dirty="0">
-                <a:solidFill>
-                  <a:srgbClr val="7030A0"/>
-                </a:solidFill>
-              </a:rPr>
-              <a:t>1</a:t>
-            </a:r>
-            <a:endParaRPr lang="en-SG" sz="1100" dirty="0">
-              <a:solidFill>
-                <a:srgbClr val="7030A0"/>
-              </a:solidFill>
-            </a:endParaRPr>
-          </a:p>
-        </p:txBody>
-      </p:sp>
-      <p:sp>
-        <p:nvSpPr>
-          <p:cNvPr id="70" name="TextBox 69"/>
-          <p:cNvSpPr txBox="1"/>
-          <p:nvPr/>
-        </p:nvSpPr>
-        <p:spPr>
-          <a:xfrm>
-            <a:off x="6449896" y="3204826"/>
-            <a:ext cx="189257" cy="178683"/>
-          </a:xfrm>
-          <a:prstGeom prst="rect">
-            <a:avLst/>
-          </a:prstGeom>
-          <a:noFill/>
-        </p:spPr>
-        <p:txBody>
-          <a:bodyPr wrap="square" lIns="0" tIns="0" rIns="0" bIns="0" rtlCol="0">
-            <a:noAutofit/>
-          </a:bodyPr>
-          <a:lstStyle/>
-          <a:p>
-            <a:pPr algn="ctr"/>
-            <a:r>
-              <a:rPr lang="en-US" sz="1100" dirty="0">
-                <a:solidFill>
-                  <a:srgbClr val="7030A0"/>
-                </a:solidFill>
-              </a:rPr>
-              <a:t>1</a:t>
-            </a:r>
-            <a:endParaRPr lang="en-SG" sz="1100" dirty="0">
-              <a:solidFill>
-                <a:srgbClr val="7030A0"/>
-              </a:solidFill>
-            </a:endParaRPr>
-          </a:p>
-        </p:txBody>
-      </p:sp>
-      <p:sp>
-        <p:nvSpPr>
-          <p:cNvPr id="52" name="Rectangle 8">
+          <p:cNvPr id="71" name="Straight Arrow Connector 70">
             <a:extLst>
               <a:ext uri="{FF2B5EF4-FFF2-40B4-BE49-F238E27FC236}">
-                <a16:creationId xmlns:a16="http://schemas.microsoft.com/office/drawing/2014/main" id="{ABDCDBD2-131A-4B66-A2F2-43BBEE82C773}"/>
-              </a:ext>
-            </a:extLst>
-          </p:cNvPr>
-          <p:cNvSpPr/>
-          <p:nvPr/>
-        </p:nvSpPr>
-        <p:spPr>
-          <a:xfrm>
-            <a:off x="7712397" y="2228817"/>
-            <a:ext cx="708186" cy="285783"/>
-          </a:xfrm>
-          <a:prstGeom prst="rect">
-            <a:avLst/>
-          </a:prstGeom>
-          <a:ln w="19050">
-            <a:solidFill>
-              <a:srgbClr val="7030A0"/>
-            </a:solidFill>
-          </a:ln>
-          <a:effectLst/>
-        </p:spPr>
-        <p:style>
-          <a:lnRef idx="1">
-            <a:schemeClr val="accent4"/>
-          </a:lnRef>
-          <a:fillRef idx="2">
-            <a:schemeClr val="accent4"/>
-          </a:fillRef>
-          <a:effectRef idx="1">
-            <a:schemeClr val="accent4"/>
-          </a:effectRef>
-          <a:fontRef idx="minor">
-            <a:schemeClr val="dk1"/>
-          </a:fontRef>
-        </p:style>
-        <p:txBody>
-          <a:bodyPr rtlCol="0" anchor="ctr"/>
-          <a:lstStyle/>
-          <a:p>
-            <a:pPr algn="ctr"/>
-            <a:r>
-              <a:rPr lang="en-US" sz="1050" dirty="0">
-                <a:solidFill>
-                  <a:srgbClr val="7030A0"/>
-                </a:solidFill>
-              </a:rPr>
-              <a:t>Tag</a:t>
-            </a:r>
-            <a:endParaRPr lang="en-SG" sz="1050" dirty="0">
-              <a:solidFill>
-                <a:srgbClr val="7030A0"/>
-              </a:solidFill>
-            </a:endParaRPr>
-          </a:p>
-        </p:txBody>
-      </p:sp>
-      <p:cxnSp>
-        <p:nvCxnSpPr>
-          <p:cNvPr id="53" name="Elbow Connector 78">
-            <a:extLst>
-              <a:ext uri="{FF2B5EF4-FFF2-40B4-BE49-F238E27FC236}">
-                <a16:creationId xmlns:a16="http://schemas.microsoft.com/office/drawing/2014/main" id="{B97967F8-618A-448B-81FD-CDFD4AF0EC64}"/>
+                <a16:creationId xmlns:a16="http://schemas.microsoft.com/office/drawing/2014/main" id="{BB3B4D99-C9A8-437C-9F18-EC2188BDA666}"/>
               </a:ext>
             </a:extLst>
           </p:cNvPr>
           <p:cNvCxnSpPr>
             <a:cxnSpLocks/>
-            <a:stCxn id="78" idx="3"/>
-            <a:endCxn id="52" idx="1"/>
+            <a:stCxn id="63" idx="3"/>
           </p:cNvCxnSpPr>
           <p:nvPr/>
         </p:nvCxnSpPr>
         <p:spPr>
-          <a:xfrm flipV="1">
-            <a:off x="7277995" y="2371709"/>
-            <a:ext cx="434402" cy="663182"/>
-          </a:xfrm>
-          <a:prstGeom prst="bentConnector3">
-            <a:avLst>
-              <a:gd name="adj1" fmla="val 50000"/>
-            </a:avLst>
-          </a:prstGeom>
-          <a:ln w="19050">
-            <a:solidFill>
-              <a:srgbClr val="7030A0"/>
-            </a:solidFill>
-            <a:headEnd type="none" w="med" len="med"/>
-            <a:tailEnd type="arrow" w="med" len="med"/>
-          </a:ln>
-          <a:effectLst/>
-        </p:spPr>
-        <p:style>
-          <a:lnRef idx="1">
-            <a:schemeClr val="accent2"/>
-          </a:lnRef>
-          <a:fillRef idx="2">
-            <a:schemeClr val="accent2"/>
-          </a:fillRef>
-          <a:effectRef idx="1">
-            <a:schemeClr val="accent2"/>
-          </a:effectRef>
-          <a:fontRef idx="minor">
-            <a:schemeClr val="dk1"/>
-          </a:fontRef>
-        </p:style>
-      </p:cxnSp>
-      <p:sp>
-        <p:nvSpPr>
-          <p:cNvPr id="50" name="TextBox 49">
-            <a:extLst>
-              <a:ext uri="{FF2B5EF4-FFF2-40B4-BE49-F238E27FC236}">
-                <a16:creationId xmlns:a16="http://schemas.microsoft.com/office/drawing/2014/main" id="{B3FA9D57-880F-49C4-AD0B-A64E30D6F403}"/>
-              </a:ext>
-            </a:extLst>
-          </p:cNvPr>
-          <p:cNvSpPr txBox="1"/>
-          <p:nvPr/>
-        </p:nvSpPr>
-        <p:spPr>
           <a:xfrm>
-            <a:off x="7466243" y="2255711"/>
-            <a:ext cx="189257" cy="178683"/>
-          </a:xfrm>
-          <a:prstGeom prst="rect">
-            <a:avLst/>
-          </a:prstGeom>
-          <a:noFill/>
-        </p:spPr>
-        <p:txBody>
-          <a:bodyPr wrap="square" lIns="0" tIns="0" rIns="0" bIns="0" rtlCol="0">
-            <a:noAutofit/>
-          </a:bodyPr>
-          <a:lstStyle/>
-          <a:p>
-            <a:pPr algn="ctr"/>
-            <a:r>
-              <a:rPr lang="en-US" sz="1100" dirty="0">
-                <a:solidFill>
-                  <a:srgbClr val="7030A0"/>
-                </a:solidFill>
-              </a:rPr>
-              <a:t>*</a:t>
-            </a:r>
-            <a:endParaRPr lang="en-SG" sz="1100" dirty="0">
-              <a:solidFill>
-                <a:srgbClr val="7030A0"/>
-              </a:solidFill>
-            </a:endParaRPr>
-          </a:p>
-        </p:txBody>
-      </p:sp>
-      <p:sp>
-        <p:nvSpPr>
-          <p:cNvPr id="55" name="Rectangle 8"/>
-          <p:cNvSpPr/>
-          <p:nvPr/>
-        </p:nvSpPr>
-        <p:spPr>
-          <a:xfrm>
-            <a:off x="3170181" y="1998350"/>
-            <a:ext cx="1060683" cy="364396"/>
-          </a:xfrm>
-          <a:prstGeom prst="rect">
-            <a:avLst/>
-          </a:prstGeom>
-          <a:ln w="19050">
-            <a:solidFill>
-              <a:srgbClr val="7030A0"/>
-            </a:solidFill>
-          </a:ln>
-          <a:effectLst/>
-        </p:spPr>
-        <p:style>
-          <a:lnRef idx="1">
-            <a:schemeClr val="accent4"/>
-          </a:lnRef>
-          <a:fillRef idx="2">
-            <a:schemeClr val="accent4"/>
-          </a:fillRef>
-          <a:effectRef idx="1">
-            <a:schemeClr val="accent4"/>
-          </a:effectRef>
-          <a:fontRef idx="minor">
-            <a:schemeClr val="dk1"/>
-          </a:fontRef>
-        </p:style>
-        <p:txBody>
-          <a:bodyPr rtlCol="0" anchor="ctr"/>
-          <a:lstStyle/>
-          <a:p>
-            <a:pPr algn="ctr"/>
-            <a:r>
-              <a:rPr lang="en-US" sz="1050" dirty="0" err="1">
-                <a:solidFill>
-                  <a:srgbClr val="7030A0"/>
-                </a:solidFill>
-              </a:rPr>
-              <a:t>AddressBook</a:t>
-            </a:r>
-            <a:endParaRPr lang="en-SG" sz="1050" dirty="0">
-              <a:solidFill>
-                <a:srgbClr val="7030A0"/>
-              </a:solidFill>
-            </a:endParaRPr>
-          </a:p>
-        </p:txBody>
-      </p:sp>
-      <p:cxnSp>
-        <p:nvCxnSpPr>
-          <p:cNvPr id="60" name="Straight Arrow Connector 59"/>
-          <p:cNvCxnSpPr>
-            <a:stCxn id="51" idx="1"/>
-            <a:endCxn id="49" idx="1"/>
-          </p:cNvCxnSpPr>
-          <p:nvPr/>
-        </p:nvCxnSpPr>
-        <p:spPr>
-          <a:xfrm>
-            <a:off x="4324972" y="3007222"/>
-            <a:ext cx="367678" cy="12320"/>
+            <a:off x="6934216" y="3010889"/>
+            <a:ext cx="330480" cy="7979"/>
           </a:xfrm>
           <a:prstGeom prst="straightConnector1">
             <a:avLst/>
@@ -5524,284 +5253,6 @@
             </a:solidFill>
             <a:headEnd type="none" w="med" len="med"/>
             <a:tailEnd type="arrow" w="med" len="med"/>
-          </a:ln>
-          <a:effectLst/>
-        </p:spPr>
-        <p:style>
-          <a:lnRef idx="1">
-            <a:schemeClr val="accent2"/>
-          </a:lnRef>
-          <a:fillRef idx="2">
-            <a:schemeClr val="accent2"/>
-          </a:fillRef>
-          <a:effectRef idx="1">
-            <a:schemeClr val="accent2"/>
-          </a:effectRef>
-          <a:fontRef idx="minor">
-            <a:schemeClr val="dk1"/>
-          </a:fontRef>
-        </p:style>
-      </p:cxnSp>
-      <p:sp>
-        <p:nvSpPr>
-          <p:cNvPr id="68" name="Isosceles Triangle 102"/>
-          <p:cNvSpPr/>
-          <p:nvPr/>
-        </p:nvSpPr>
-        <p:spPr>
-          <a:xfrm rot="16200000">
-            <a:off x="2669073" y="2069158"/>
-            <a:ext cx="271014" cy="187417"/>
-          </a:xfrm>
-          <a:prstGeom prst="triangle">
-            <a:avLst>
-              <a:gd name="adj" fmla="val 44517"/>
-            </a:avLst>
-          </a:prstGeom>
-          <a:solidFill>
-            <a:schemeClr val="accent4">
-              <a:lumMod val="20000"/>
-              <a:lumOff val="80000"/>
-            </a:schemeClr>
-          </a:solidFill>
-          <a:ln w="19050">
-            <a:solidFill>
-              <a:srgbClr val="7030A0"/>
-            </a:solidFill>
-          </a:ln>
-          <a:effectLst/>
-        </p:spPr>
-        <p:style>
-          <a:lnRef idx="1">
-            <a:schemeClr val="accent6"/>
-          </a:lnRef>
-          <a:fillRef idx="2">
-            <a:schemeClr val="accent6"/>
-          </a:fillRef>
-          <a:effectRef idx="1">
-            <a:schemeClr val="accent6"/>
-          </a:effectRef>
-          <a:fontRef idx="minor">
-            <a:schemeClr val="dk1"/>
-          </a:fontRef>
-        </p:style>
-        <p:txBody>
-          <a:bodyPr rtlCol="0" anchor="ctr"/>
-          <a:lstStyle/>
-          <a:p>
-            <a:pPr algn="ctr"/>
-            <a:endParaRPr lang="en-SG" sz="1050"/>
-          </a:p>
-        </p:txBody>
-      </p:sp>
-      <p:cxnSp>
-        <p:nvCxnSpPr>
-          <p:cNvPr id="69" name="Elbow Connector 63"/>
-          <p:cNvCxnSpPr>
-            <a:stCxn id="68" idx="3"/>
-            <a:endCxn id="55" idx="1"/>
-          </p:cNvCxnSpPr>
-          <p:nvPr/>
-        </p:nvCxnSpPr>
-        <p:spPr>
-          <a:xfrm>
-            <a:off x="2898289" y="2177727"/>
-            <a:ext cx="271892" cy="2821"/>
-          </a:xfrm>
-          <a:prstGeom prst="bentConnector3">
-            <a:avLst>
-              <a:gd name="adj1" fmla="val 50000"/>
-            </a:avLst>
-          </a:prstGeom>
-          <a:ln w="19050">
-            <a:solidFill>
-              <a:srgbClr val="7030A0"/>
-            </a:solidFill>
-            <a:prstDash val="sysDot"/>
-            <a:headEnd type="none" w="med" len="med"/>
-            <a:tailEnd type="none" w="med" len="med"/>
-          </a:ln>
-          <a:effectLst/>
-        </p:spPr>
-        <p:style>
-          <a:lnRef idx="1">
-            <a:schemeClr val="accent2"/>
-          </a:lnRef>
-          <a:fillRef idx="2">
-            <a:schemeClr val="accent2"/>
-          </a:fillRef>
-          <a:effectRef idx="1">
-            <a:schemeClr val="accent2"/>
-          </a:effectRef>
-          <a:fontRef idx="minor">
-            <a:schemeClr val="dk1"/>
-          </a:fontRef>
-        </p:style>
-      </p:cxnSp>
-      <p:sp>
-        <p:nvSpPr>
-          <p:cNvPr id="57" name="Rectangle 8">
-            <a:extLst>
-              <a:ext uri="{FF2B5EF4-FFF2-40B4-BE49-F238E27FC236}">
-                <a16:creationId xmlns:a16="http://schemas.microsoft.com/office/drawing/2014/main" id="{6A42DA50-9012-4391-9EF3-285E4FA3FCD8}"/>
-              </a:ext>
-            </a:extLst>
-          </p:cNvPr>
-          <p:cNvSpPr/>
-          <p:nvPr/>
-        </p:nvSpPr>
-        <p:spPr>
-          <a:xfrm>
-            <a:off x="4238892" y="3460864"/>
-            <a:ext cx="1293486" cy="346760"/>
-          </a:xfrm>
-          <a:prstGeom prst="rect">
-            <a:avLst/>
-          </a:prstGeom>
-          <a:ln w="19050">
-            <a:solidFill>
-              <a:srgbClr val="7030A0"/>
-            </a:solidFill>
-          </a:ln>
-          <a:effectLst/>
-        </p:spPr>
-        <p:style>
-          <a:lnRef idx="1">
-            <a:schemeClr val="accent4"/>
-          </a:lnRef>
-          <a:fillRef idx="2">
-            <a:schemeClr val="accent4"/>
-          </a:fillRef>
-          <a:effectRef idx="1">
-            <a:schemeClr val="accent4"/>
-          </a:effectRef>
-          <a:fontRef idx="minor">
-            <a:schemeClr val="dk1"/>
-          </a:fontRef>
-        </p:style>
-        <p:txBody>
-          <a:bodyPr rtlCol="0" anchor="ctr"/>
-          <a:lstStyle/>
-          <a:p>
-            <a:pPr algn="ctr"/>
-            <a:r>
-              <a:rPr lang="en-US" sz="1050" dirty="0">
-                <a:solidFill>
-                  <a:srgbClr val="7030A0"/>
-                </a:solidFill>
-              </a:rPr>
-              <a:t>&lt;&lt;interface&gt;&gt;</a:t>
-            </a:r>
-          </a:p>
-          <a:p>
-            <a:pPr algn="ctr"/>
-            <a:r>
-              <a:rPr lang="en-US" sz="1050" dirty="0" err="1">
-                <a:solidFill>
-                  <a:srgbClr val="7030A0"/>
-                </a:solidFill>
-              </a:rPr>
-              <a:t>ReadOnlyUserPrefs</a:t>
-            </a:r>
-            <a:endParaRPr lang="en-SG" sz="1050" dirty="0">
-              <a:solidFill>
-                <a:srgbClr val="7030A0"/>
-              </a:solidFill>
-            </a:endParaRPr>
-          </a:p>
-        </p:txBody>
-      </p:sp>
-      <p:sp>
-        <p:nvSpPr>
-          <p:cNvPr id="59" name="Isosceles Triangle 102">
-            <a:extLst>
-              <a:ext uri="{FF2B5EF4-FFF2-40B4-BE49-F238E27FC236}">
-                <a16:creationId xmlns:a16="http://schemas.microsoft.com/office/drawing/2014/main" id="{B263B2D7-6E76-465E-B40E-7E2A46254A84}"/>
-              </a:ext>
-            </a:extLst>
-          </p:cNvPr>
-          <p:cNvSpPr/>
-          <p:nvPr/>
-        </p:nvSpPr>
-        <p:spPr>
-          <a:xfrm rot="5400000" flipH="1">
-            <a:off x="3992636" y="3514414"/>
-            <a:ext cx="271014" cy="221497"/>
-          </a:xfrm>
-          <a:prstGeom prst="triangle">
-            <a:avLst>
-              <a:gd name="adj" fmla="val 44517"/>
-            </a:avLst>
-          </a:prstGeom>
-          <a:solidFill>
-            <a:schemeClr val="accent4">
-              <a:lumMod val="20000"/>
-              <a:lumOff val="80000"/>
-            </a:schemeClr>
-          </a:solidFill>
-          <a:ln w="19050">
-            <a:solidFill>
-              <a:srgbClr val="7030A0"/>
-            </a:solidFill>
-          </a:ln>
-          <a:effectLst/>
-        </p:spPr>
-        <p:style>
-          <a:lnRef idx="1">
-            <a:schemeClr val="accent6"/>
-          </a:lnRef>
-          <a:fillRef idx="2">
-            <a:schemeClr val="accent6"/>
-          </a:fillRef>
-          <a:effectRef idx="1">
-            <a:schemeClr val="accent6"/>
-          </a:effectRef>
-          <a:fontRef idx="minor">
-            <a:schemeClr val="dk1"/>
-          </a:fontRef>
-        </p:style>
-        <p:txBody>
-          <a:bodyPr rtlCol="0" anchor="ctr"/>
-          <a:lstStyle/>
-          <a:p>
-            <a:pPr algn="ctr"/>
-            <a:endParaRPr lang="en-SG" sz="1050"/>
-          </a:p>
-        </p:txBody>
-      </p:sp>
-      <p:cxnSp>
-        <p:nvCxnSpPr>
-          <p:cNvPr id="67" name="Elbow Connector 63">
-            <a:extLst>
-              <a:ext uri="{FF2B5EF4-FFF2-40B4-BE49-F238E27FC236}">
-                <a16:creationId xmlns:a16="http://schemas.microsoft.com/office/drawing/2014/main" id="{BA3A25CD-7C1D-4B3B-B294-1B05ABCFECFD}"/>
-              </a:ext>
-            </a:extLst>
-          </p:cNvPr>
-          <p:cNvCxnSpPr>
-            <a:cxnSpLocks/>
-            <a:stCxn id="59" idx="3"/>
-            <a:endCxn id="2" idx="3"/>
-          </p:cNvCxnSpPr>
-          <p:nvPr/>
-        </p:nvCxnSpPr>
-        <p:spPr>
-          <a:xfrm rot="10800000">
-            <a:off x="3703491" y="3636621"/>
-            <a:ext cx="313904" cy="3403"/>
-          </a:xfrm>
-          <a:prstGeom prst="bentConnector3">
-            <a:avLst>
-              <a:gd name="adj1" fmla="val 50000"/>
-            </a:avLst>
-          </a:prstGeom>
-          <a:ln w="19050">
-            <a:solidFill>
-              <a:srgbClr val="7030A0"/>
-            </a:solidFill>
-            <a:prstDash val="sysDot"/>
-            <a:headEnd type="none" w="med" len="med"/>
-            <a:tailEnd type="none" w="med" len="med"/>
           </a:ln>
           <a:effectLst/>
         </p:spPr>

</xml_diff>

<commit_message>
Describe implementation for holding records and editMember command
</commit_message>
<xml_diff>
--- a/docs/diagrams/ModelComponentClassDiagram.pptx
+++ b/docs/diagrams/ModelComponentClassDiagram.pptx
@@ -4682,7 +4682,7 @@
                   <a:srgbClr val="7030A0"/>
                 </a:solidFill>
               </a:rPr>
-              <a:t>1</a:t>
+              <a:t>4</a:t>
             </a:r>
             <a:endParaRPr lang="en-SG" sz="1100" dirty="0">
               <a:solidFill>
@@ -4838,7 +4838,7 @@
                   <a:srgbClr val="7030A0"/>
                 </a:solidFill>
               </a:rPr>
-              <a:t>1</a:t>
+              <a:t>4</a:t>
             </a:r>
             <a:endParaRPr lang="en-SG" sz="1100" dirty="0">
               <a:solidFill>

</xml_diff>